<commit_message>
cours poo + 4 nvx exos
</commit_message>
<xml_diff>
--- a/js.pptx
+++ b/js.pptx
@@ -357,7 +357,7 @@
           <a:p>
             <a:fld id="{56C2D11A-4A4C-4762-9A3D-38B816BFA086}" type="datetimeFigureOut">
               <a:rPr lang="fr-FR" smtClean="0"/>
-              <a:t>29/08/2024</a:t>
+              <a:t>10/09/2024</a:t>
             </a:fld>
             <a:endParaRPr lang="fr-FR" dirty="0"/>
           </a:p>
@@ -522,7 +522,7 @@
           <a:p>
             <a:fld id="{DD3E8838-E61C-436D-81FA-CFC9A861CF2C}" type="datetimeFigureOut">
               <a:rPr lang="fr-FR" noProof="0" smtClean="0"/>
-              <a:t>29/08/2024</a:t>
+              <a:t>10/09/2024</a:t>
             </a:fld>
             <a:endParaRPr lang="fr-FR" noProof="0" dirty="0"/>
           </a:p>
@@ -1036,7 +1036,7 @@
             <a:pPr rtl="0"/>
             <a:fld id="{92829AA3-688F-4FAF-9C70-2EAED5DE0A5F}" type="datetime1">
               <a:rPr lang="fr-FR" noProof="0" smtClean="0"/>
-              <a:t>29/08/2024</a:t>
+              <a:t>10/09/2024</a:t>
             </a:fld>
             <a:endParaRPr lang="fr-FR" noProof="0" dirty="0"/>
           </a:p>
@@ -1228,7 +1228,7 @@
             <a:pPr rtl="0"/>
             <a:fld id="{3B779C31-26A2-4001-8DD7-CEA4A5920D6F}" type="datetime1">
               <a:rPr lang="fr-FR" noProof="0" smtClean="0"/>
-              <a:t>29/08/2024</a:t>
+              <a:t>10/09/2024</a:t>
             </a:fld>
             <a:endParaRPr lang="fr-FR" noProof="0" dirty="0"/>
           </a:p>
@@ -1605,7 +1605,7 @@
             <a:pPr rtl="0"/>
             <a:fld id="{F123840B-CA9A-47D8-8CE3-2CB262B633CE}" type="datetime1">
               <a:rPr lang="fr-FR" noProof="0" smtClean="0"/>
-              <a:t>29/08/2024</a:t>
+              <a:t>10/09/2024</a:t>
             </a:fld>
             <a:endParaRPr lang="fr-FR" noProof="0" dirty="0"/>
           </a:p>
@@ -1864,7 +1864,7 @@
             <a:pPr rtl="0"/>
             <a:fld id="{AB61C57D-29E7-4B9C-9AAF-84272FBE0476}" type="datetime1">
               <a:rPr lang="fr-FR" noProof="0" smtClean="0"/>
-              <a:t>29/08/2024</a:t>
+              <a:t>10/09/2024</a:t>
             </a:fld>
             <a:endParaRPr lang="fr-FR" noProof="0" dirty="0"/>
           </a:p>
@@ -2265,7 +2265,7 @@
             <a:pPr rtl="0"/>
             <a:fld id="{1E313F57-3095-42DA-A8AD-EACF93632B45}" type="datetime1">
               <a:rPr lang="fr-FR" noProof="0" smtClean="0"/>
-              <a:t>29/08/2024</a:t>
+              <a:t>10/09/2024</a:t>
             </a:fld>
             <a:endParaRPr lang="fr-FR" noProof="0" dirty="0"/>
           </a:p>
@@ -2405,7 +2405,7 @@
             <a:pPr rtl="0"/>
             <a:fld id="{9DD03AE6-69D7-49FE-895F-AE1B6FEC6457}" type="datetime1">
               <a:rPr lang="fr-FR" noProof="0" smtClean="0"/>
-              <a:t>29/08/2024</a:t>
+              <a:t>10/09/2024</a:t>
             </a:fld>
             <a:endParaRPr lang="fr-FR" noProof="0" dirty="0"/>
           </a:p>
@@ -2565,7 +2565,7 @@
             <a:pPr rtl="0"/>
             <a:fld id="{17C76EA5-DE82-4067-88F3-4BF0BABA598F}" type="datetime1">
               <a:rPr lang="fr-FR" noProof="0" smtClean="0"/>
-              <a:t>29/08/2024</a:t>
+              <a:t>10/09/2024</a:t>
             </a:fld>
             <a:endParaRPr lang="fr-FR" noProof="0" dirty="0"/>
           </a:p>
@@ -2898,7 +2898,7 @@
             <a:pPr rtl="0"/>
             <a:fld id="{31C46C69-7F73-47D5-86D5-FDA507AE9AA8}" type="datetime1">
               <a:rPr lang="fr-FR" noProof="0" smtClean="0"/>
-              <a:t>29/08/2024</a:t>
+              <a:t>10/09/2024</a:t>
             </a:fld>
             <a:endParaRPr lang="fr-FR" noProof="0" dirty="0"/>
           </a:p>
@@ -3253,7 +3253,7 @@
             <a:pPr rtl="0"/>
             <a:fld id="{973E1055-39CE-418F-9B0E-741B5617658E}" type="datetime1">
               <a:rPr lang="fr-FR" noProof="0" smtClean="0"/>
-              <a:t>29/08/2024</a:t>
+              <a:t>10/09/2024</a:t>
             </a:fld>
             <a:endParaRPr lang="fr-FR" noProof="0" dirty="0"/>
           </a:p>
@@ -3515,7 +3515,7 @@
             <a:pPr rtl="0"/>
             <a:fld id="{0F708A2A-6F02-48A2-99AD-832CF5AA71DA}" type="datetime1">
               <a:rPr lang="fr-FR" noProof="0" smtClean="0"/>
-              <a:t>29/08/2024</a:t>
+              <a:t>10/09/2024</a:t>
             </a:fld>
             <a:endParaRPr lang="fr-FR" noProof="0" dirty="0"/>
           </a:p>
@@ -14035,8 +14035,8 @@
         </p:nvSpPr>
         <p:spPr>
           <a:xfrm>
-            <a:off x="679027" y="4211428"/>
-            <a:ext cx="10476653" cy="2123658"/>
+            <a:off x="679027" y="3504814"/>
+            <a:ext cx="10476653" cy="3231654"/>
           </a:xfrm>
           <a:prstGeom prst="rect">
             <a:avLst/>
@@ -14077,7 +14077,26 @@
                 <a:effectLst/>
                 <a:latin typeface="udemy sans"/>
               </a:rPr>
-              <a:t>valeurs uniques de tout type</a:t>
+              <a:t>valeurs uniques</a:t>
+            </a:r>
+            <a:r>
+              <a:rPr lang="fr-FR" sz="2400" b="1" dirty="0">
+                <a:solidFill>
+                  <a:srgbClr val="1C1D1F"/>
+                </a:solidFill>
+                <a:latin typeface="udemy sans"/>
+              </a:rPr>
+              <a:t>, sans clés, </a:t>
+            </a:r>
+            <a:r>
+              <a:rPr lang="fr-FR" sz="2400" b="1" i="0" dirty="0">
+                <a:solidFill>
+                  <a:srgbClr val="1C1D1F"/>
+                </a:solidFill>
+                <a:effectLst/>
+                <a:latin typeface="udemy sans"/>
+              </a:rPr>
+              <a:t> de tout type</a:t>
             </a:r>
             <a:r>
               <a:rPr lang="fr-FR" sz="2400" b="0" i="0" dirty="0">
@@ -14122,6 +14141,116 @@
               </a:rPr>
               <a:t>stocker des informations qui ne doivent pas être dupliquées. </a:t>
             </a:r>
+          </a:p>
+          <a:p>
+            <a:pPr algn="ctr"/>
+            <a:endParaRPr lang="fr-FR" sz="2400" b="1" i="0" dirty="0">
+              <a:solidFill>
+                <a:srgbClr val="1C1D1F"/>
+              </a:solidFill>
+              <a:effectLst/>
+              <a:latin typeface="udemy sans"/>
+            </a:endParaRPr>
+          </a:p>
+          <a:p>
+            <a:pPr algn="ctr"/>
+            <a:r>
+              <a:rPr lang="fr-FR" sz="2400" dirty="0">
+                <a:solidFill>
+                  <a:srgbClr val="1C1D1F"/>
+                </a:solidFill>
+                <a:latin typeface="udemy sans"/>
+              </a:rPr>
+              <a:t>C’est un objet </a:t>
+            </a:r>
+            <a:r>
+              <a:rPr lang="fr-FR" sz="2400" b="1" dirty="0">
+                <a:solidFill>
+                  <a:srgbClr val="1C1D1F"/>
+                </a:solidFill>
+                <a:latin typeface="udemy sans"/>
+              </a:rPr>
+              <a:t>plus performant </a:t>
+            </a:r>
+            <a:r>
+              <a:rPr lang="fr-FR" sz="2400" dirty="0">
+                <a:solidFill>
+                  <a:srgbClr val="1C1D1F"/>
+                </a:solidFill>
+                <a:latin typeface="udemy sans"/>
+              </a:rPr>
+              <a:t>que les objets ou tableaux traditionnels grâce à ses méthodes spécifiques </a:t>
+            </a:r>
+            <a:r>
+              <a:rPr lang="fr-FR" sz="2400" b="1" dirty="0">
+                <a:solidFill>
+                  <a:srgbClr val="1C1D1F"/>
+                </a:solidFill>
+                <a:latin typeface="udemy sans"/>
+              </a:rPr>
+              <a:t>:  </a:t>
+            </a:r>
+            <a:r>
+              <a:rPr lang="fr-FR" sz="2400" b="1" dirty="0" err="1">
+                <a:solidFill>
+                  <a:srgbClr val="1C1D1F"/>
+                </a:solidFill>
+                <a:latin typeface="udemy sans"/>
+              </a:rPr>
+              <a:t>add</a:t>
+            </a:r>
+            <a:r>
+              <a:rPr lang="fr-FR" sz="2400" b="1" dirty="0">
+                <a:solidFill>
+                  <a:srgbClr val="1C1D1F"/>
+                </a:solidFill>
+                <a:latin typeface="udemy sans"/>
+              </a:rPr>
+              <a:t>(), </a:t>
+            </a:r>
+            <a:r>
+              <a:rPr lang="fr-FR" sz="2400" b="1" dirty="0" err="1">
+                <a:solidFill>
+                  <a:srgbClr val="1C1D1F"/>
+                </a:solidFill>
+                <a:latin typeface="udemy sans"/>
+              </a:rPr>
+              <a:t>delete</a:t>
+            </a:r>
+            <a:r>
+              <a:rPr lang="fr-FR" sz="2400" b="1" dirty="0">
+                <a:solidFill>
+                  <a:srgbClr val="1C1D1F"/>
+                </a:solidFill>
+                <a:latin typeface="udemy sans"/>
+              </a:rPr>
+              <a:t>(), has(), </a:t>
+            </a:r>
+            <a:r>
+              <a:rPr lang="fr-FR" sz="2400" b="1" dirty="0" err="1">
+                <a:solidFill>
+                  <a:srgbClr val="1C1D1F"/>
+                </a:solidFill>
+                <a:latin typeface="udemy sans"/>
+              </a:rPr>
+              <a:t>clear</a:t>
+            </a:r>
+            <a:r>
+              <a:rPr lang="fr-FR" sz="2400" b="1" dirty="0">
+                <a:solidFill>
+                  <a:srgbClr val="1C1D1F"/>
+                </a:solidFill>
+                <a:latin typeface="udemy sans"/>
+              </a:rPr>
+              <a:t>(), size</a:t>
+            </a:r>
+            <a:endParaRPr lang="fr-FR" sz="2400" b="1" i="0" dirty="0">
+              <a:solidFill>
+                <a:srgbClr val="1C1D1F"/>
+              </a:solidFill>
+              <a:effectLst/>
+              <a:latin typeface="udemy sans"/>
+            </a:endParaRPr>
           </a:p>
           <a:p>
             <a:endParaRPr lang="fr-FR" b="1" dirty="0">
@@ -14270,8 +14399,8 @@
         </p:nvSpPr>
         <p:spPr>
           <a:xfrm>
-            <a:off x="1562948" y="4283462"/>
-            <a:ext cx="8523215" cy="1323439"/>
+            <a:off x="1562948" y="3948483"/>
+            <a:ext cx="8523215" cy="1938992"/>
           </a:xfrm>
           <a:prstGeom prst="rect">
             <a:avLst/>
@@ -14333,7 +14462,28 @@
                 <a:effectLst/>
                 <a:latin typeface="udemy sans"/>
               </a:rPr>
-              <a:t>() est bien plus flexible </a:t>
+              <a:t>() est bien plus flexible en permettant d’utiliser tout type de </a:t>
+            </a:r>
+            <a:r>
+              <a:rPr lang="fr-FR" sz="2000" dirty="0">
+                <a:solidFill>
+                  <a:srgbClr val="1C1D1F"/>
+                </a:solidFill>
+                <a:latin typeface="udemy sans"/>
+              </a:rPr>
+              <a:t>données en clés.</a:t>
+            </a:r>
+          </a:p>
+          <a:p>
+            <a:pPr algn="ctr"/>
+            <a:r>
+              <a:rPr lang="fr-FR" sz="2000" dirty="0">
+                <a:solidFill>
+                  <a:srgbClr val="1C1D1F"/>
+                </a:solidFill>
+                <a:latin typeface="udemy sans"/>
+              </a:rPr>
+              <a:t>Il est également plus performant </a:t>
             </a:r>
             <a:r>
               <a:rPr lang="fr-FR" sz="2000" b="1" i="0" dirty="0">
@@ -14393,17 +14543,35 @@
                 <a:effectLst/>
                 <a:latin typeface="udemy sans"/>
               </a:rPr>
-              <a:t>, </a:t>
-            </a:r>
-            <a:r>
-              <a:rPr lang="fr-FR" sz="2000" i="0">
+              <a:t>, has(), </a:t>
+            </a:r>
+            <a:r>
+              <a:rPr lang="fr-FR" sz="2000" i="0" dirty="0" err="1">
                 <a:solidFill>
                   <a:srgbClr val="1C1D1F"/>
                 </a:solidFill>
                 <a:effectLst/>
                 <a:latin typeface="udemy sans"/>
               </a:rPr>
-              <a:t>has(),size() </a:t>
+              <a:t>clea</a:t>
+            </a:r>
+            <a:r>
+              <a:rPr lang="fr-FR" sz="2000" dirty="0" err="1">
+                <a:solidFill>
+                  <a:srgbClr val="1C1D1F"/>
+                </a:solidFill>
+                <a:latin typeface="udemy sans"/>
+              </a:rPr>
+              <a:t>r</a:t>
+            </a:r>
+            <a:r>
+              <a:rPr lang="fr-FR" sz="2000" dirty="0">
+                <a:solidFill>
+                  <a:srgbClr val="1C1D1F"/>
+                </a:solidFill>
+                <a:latin typeface="udemy sans"/>
+              </a:rPr>
+              <a:t>(), </a:t>
             </a:r>
             <a:r>
               <a:rPr lang="fr-FR" sz="2000" i="0" dirty="0">
@@ -14413,7 +14581,7 @@
                 <a:effectLst/>
                 <a:latin typeface="udemy sans"/>
               </a:rPr>
-              <a:t>.</a:t>
+              <a:t>size .</a:t>
             </a:r>
           </a:p>
           <a:p>
@@ -14466,7 +14634,7 @@
         </p:nvSpPr>
         <p:spPr>
           <a:xfrm>
-            <a:off x="2138875" y="5785109"/>
+            <a:off x="2000339" y="5887475"/>
             <a:ext cx="7781501" cy="400110"/>
           </a:xfrm>
           <a:prstGeom prst="rect">
@@ -14494,7 +14662,7 @@
             </a:r>
             <a:r>
               <a:rPr lang="fr-FR" sz="2000" b="1" dirty="0"/>
-              <a:t>éléments complets </a:t>
+              <a:t>objets complets </a:t>
             </a:r>
           </a:p>
         </p:txBody>
@@ -16154,7 +16322,25 @@
                 </a:solidFill>
                 <a:latin typeface="udemy sans"/>
               </a:rPr>
-              <a:t>: Cette méthode est utilisée pour renvoyer le nombre de millisecondes depuis le 1er janvier 1970 pour la date spécifiée.</a:t>
+              <a:t>: Cette méthode est utilisée pour renvoyer le nombre de </a:t>
+            </a:r>
+            <a:r>
+              <a:rPr lang="fr-FR" b="1" dirty="0">
+                <a:solidFill>
+                  <a:srgbClr val="1C1D1F"/>
+                </a:solidFill>
+                <a:latin typeface="udemy sans"/>
+              </a:rPr>
+              <a:t>millisecondes</a:t>
+            </a:r>
+            <a:r>
+              <a:rPr lang="fr-FR" dirty="0">
+                <a:solidFill>
+                  <a:srgbClr val="1C1D1F"/>
+                </a:solidFill>
+                <a:latin typeface="udemy sans"/>
+              </a:rPr>
+              <a:t> depuis le 1er janvier 1970 pour la date spécifiée.</a:t>
             </a:r>
           </a:p>
           <a:p>
@@ -17122,7 +17308,25 @@
                 </a:solidFill>
                 <a:latin typeface="udemy sans"/>
               </a:rPr>
-              <a:t>compris entre 0 (inclus) et 1 (exclus).</a:t>
+              <a:t>compris entre 0 (inclus) et 1 (</a:t>
+            </a:r>
+            <a:r>
+              <a:rPr lang="fr-FR" sz="2000" b="1" dirty="0">
+                <a:solidFill>
+                  <a:srgbClr val="1C1D1F"/>
+                </a:solidFill>
+                <a:latin typeface="udemy sans"/>
+              </a:rPr>
+              <a:t>exclus</a:t>
+            </a:r>
+            <a:r>
+              <a:rPr lang="fr-FR" sz="2000" dirty="0">
+                <a:solidFill>
+                  <a:srgbClr val="1C1D1F"/>
+                </a:solidFill>
+                <a:latin typeface="udemy sans"/>
+              </a:rPr>
+              <a:t>).</a:t>
             </a:r>
           </a:p>
           <a:p>
@@ -18682,7 +18886,7 @@
           <a:p>
             <a:r>
               <a:rPr lang="fr-FR" dirty="0"/>
-              <a:t>Pour ce faire nous déclarons la méthode hors de notre constructeur, et grâce à la syntaxe suivante nous le déclarons dans le prototype </a:t>
+              <a:t>Pour ce faire nous déclarons la méthode hors de notre constructeur, et grâce à la syntaxe suivante nous la déclarons dans le prototype </a:t>
             </a:r>
           </a:p>
         </p:txBody>
@@ -20789,12 +20993,86 @@
           </a:p>
         </p:txBody>
       </p:sp>
+      <p:sp>
+        <p:nvSpPr>
+          <p:cNvPr id="19" name="ZoneTexte 18">
+            <a:extLst>
+              <a:ext uri="{FF2B5EF4-FFF2-40B4-BE49-F238E27FC236}">
+                <a16:creationId xmlns:a16="http://schemas.microsoft.com/office/drawing/2014/main" id="{32F707FE-DDC3-B10B-036E-80C75F9BFDCA}"/>
+              </a:ext>
+            </a:extLst>
+          </p:cNvPr>
+          <p:cNvSpPr txBox="1"/>
+          <p:nvPr/>
+        </p:nvSpPr>
+        <p:spPr>
+          <a:xfrm>
+            <a:off x="378543" y="4474445"/>
+            <a:ext cx="11098634" cy="1477328"/>
+          </a:xfrm>
+          <a:prstGeom prst="rect">
+            <a:avLst/>
+          </a:prstGeom>
+          <a:noFill/>
+        </p:spPr>
+        <p:txBody>
+          <a:bodyPr wrap="square" rtlCol="0">
+            <a:spAutoFit/>
+          </a:bodyPr>
+          <a:lstStyle/>
+          <a:p>
+            <a:pPr>
+              <a:lnSpc>
+                <a:spcPct val="150000"/>
+              </a:lnSpc>
+            </a:pPr>
+            <a:r>
+              <a:rPr lang="fr-FR" dirty="0"/>
+              <a:t>Dans cet exemple nous définissons deux propriétés, la propriété </a:t>
+            </a:r>
+            <a:r>
+              <a:rPr lang="fr-FR" dirty="0" err="1"/>
+              <a:t>age</a:t>
+            </a:r>
+            <a:r>
+              <a:rPr lang="fr-FR" dirty="0"/>
+              <a:t> est déclaré avec </a:t>
+            </a:r>
+            <a:r>
+              <a:rPr lang="fr-FR" b="1" dirty="0"/>
+              <a:t>#age</a:t>
+            </a:r>
+            <a:r>
+              <a:rPr lang="fr-FR" dirty="0"/>
+              <a:t>, ceci est une </a:t>
+            </a:r>
+            <a:r>
+              <a:rPr lang="fr-FR" b="1" dirty="0"/>
+              <a:t>convention</a:t>
+            </a:r>
+            <a:r>
+              <a:rPr lang="fr-FR" dirty="0"/>
+              <a:t> afin d’indiquer que la </a:t>
+            </a:r>
+            <a:r>
+              <a:rPr lang="fr-FR" b="1" dirty="0"/>
+              <a:t>propriété doit être considéré comme privé.</a:t>
+            </a:r>
+          </a:p>
+          <a:p>
+            <a:endParaRPr lang="fr-FR" dirty="0"/>
+          </a:p>
+          <a:p>
+            <a:endParaRPr lang="fr-FR" dirty="0"/>
+          </a:p>
+        </p:txBody>
+      </p:sp>
       <p:pic>
         <p:nvPicPr>
-          <p:cNvPr id="7" name="Image 6">
-            <a:extLst>
-              <a:ext uri="{FF2B5EF4-FFF2-40B4-BE49-F238E27FC236}">
-                <a16:creationId xmlns:a16="http://schemas.microsoft.com/office/drawing/2014/main" id="{8046308B-599E-46B5-787D-960689AF0EC8}"/>
+          <p:cNvPr id="4" name="Image 3">
+            <a:extLst>
+              <a:ext uri="{FF2B5EF4-FFF2-40B4-BE49-F238E27FC236}">
+                <a16:creationId xmlns:a16="http://schemas.microsoft.com/office/drawing/2014/main" id="{56452E1D-4C4F-7969-570C-113FAD4D3985}"/>
               </a:ext>
             </a:extLst>
           </p:cNvPr>
@@ -20811,8 +21089,8 @@
         </p:blipFill>
         <p:spPr>
           <a:xfrm>
-            <a:off x="0" y="2244056"/>
-            <a:ext cx="3496163" cy="1400370"/>
+            <a:off x="173428" y="1965169"/>
+            <a:ext cx="3553082" cy="2092002"/>
           </a:xfrm>
           <a:prstGeom prst="rect">
             <a:avLst/>
@@ -20821,10 +21099,10 @@
       </p:pic>
       <p:pic>
         <p:nvPicPr>
-          <p:cNvPr id="11" name="Image 10">
-            <a:extLst>
-              <a:ext uri="{FF2B5EF4-FFF2-40B4-BE49-F238E27FC236}">
-                <a16:creationId xmlns:a16="http://schemas.microsoft.com/office/drawing/2014/main" id="{A542DE3B-B5F2-A8DE-69C3-8AFCB2DBB249}"/>
+          <p:cNvPr id="6" name="Image 5">
+            <a:extLst>
+              <a:ext uri="{FF2B5EF4-FFF2-40B4-BE49-F238E27FC236}">
+                <a16:creationId xmlns:a16="http://schemas.microsoft.com/office/drawing/2014/main" id="{2ED5D0C7-4F1A-22E2-6FDA-5A3A8FA25E5D}"/>
               </a:ext>
             </a:extLst>
           </p:cNvPr>
@@ -20841,106 +21119,20 @@
         </p:blipFill>
         <p:spPr>
           <a:xfrm>
-            <a:off x="3936924" y="2244056"/>
-            <a:ext cx="4261233" cy="1400370"/>
+            <a:off x="3964604" y="2247286"/>
+            <a:ext cx="4074873" cy="1347721"/>
           </a:xfrm>
           <a:prstGeom prst="rect">
             <a:avLst/>
           </a:prstGeom>
         </p:spPr>
       </p:pic>
-      <p:sp>
-        <p:nvSpPr>
-          <p:cNvPr id="19" name="ZoneTexte 18">
-            <a:extLst>
-              <a:ext uri="{FF2B5EF4-FFF2-40B4-BE49-F238E27FC236}">
-                <a16:creationId xmlns:a16="http://schemas.microsoft.com/office/drawing/2014/main" id="{32F707FE-DDC3-B10B-036E-80C75F9BFDCA}"/>
-              </a:ext>
-            </a:extLst>
-          </p:cNvPr>
-          <p:cNvSpPr txBox="1"/>
-          <p:nvPr/>
-        </p:nvSpPr>
-        <p:spPr>
-          <a:xfrm>
-            <a:off x="378543" y="4474445"/>
-            <a:ext cx="11098634" cy="1892826"/>
-          </a:xfrm>
-          <a:prstGeom prst="rect">
-            <a:avLst/>
-          </a:prstGeom>
-          <a:noFill/>
-        </p:spPr>
-        <p:txBody>
-          <a:bodyPr wrap="square" rtlCol="0">
-            <a:spAutoFit/>
-          </a:bodyPr>
-          <a:lstStyle/>
-          <a:p>
-            <a:pPr>
-              <a:lnSpc>
-                <a:spcPct val="150000"/>
-              </a:lnSpc>
-            </a:pPr>
-            <a:r>
-              <a:rPr lang="fr-FR" dirty="0"/>
-              <a:t>Dans cet exemple nous définissons deux propriétés, la propriété </a:t>
-            </a:r>
-            <a:r>
-              <a:rPr lang="fr-FR" dirty="0" err="1"/>
-              <a:t>age</a:t>
-            </a:r>
-            <a:r>
-              <a:rPr lang="fr-FR" dirty="0"/>
-              <a:t> est déclaré avec </a:t>
-            </a:r>
-            <a:r>
-              <a:rPr lang="fr-FR" b="1" dirty="0"/>
-              <a:t>_</a:t>
-            </a:r>
-            <a:r>
-              <a:rPr lang="fr-FR" b="1" dirty="0" err="1"/>
-              <a:t>age</a:t>
-            </a:r>
-            <a:r>
-              <a:rPr lang="fr-FR" dirty="0"/>
-              <a:t>, ceci est une </a:t>
-            </a:r>
-            <a:r>
-              <a:rPr lang="fr-FR" b="1" dirty="0"/>
-              <a:t>convention</a:t>
-            </a:r>
-            <a:r>
-              <a:rPr lang="fr-FR" dirty="0"/>
-              <a:t> afin d’indiquer que la </a:t>
-            </a:r>
-            <a:r>
-              <a:rPr lang="fr-FR" b="1" dirty="0"/>
-              <a:t>propriété doit être considéré comme privé</a:t>
-            </a:r>
-            <a:r>
-              <a:rPr lang="fr-FR" dirty="0"/>
-              <a:t>, bien qu’en JavaScript il </a:t>
-            </a:r>
-            <a:r>
-              <a:rPr lang="fr-FR" b="1" dirty="0"/>
-              <a:t>n’existe pas réellement de propriétés privées. </a:t>
-            </a:r>
-          </a:p>
-          <a:p>
-            <a:endParaRPr lang="fr-FR" dirty="0"/>
-          </a:p>
-          <a:p>
-            <a:endParaRPr lang="fr-FR" dirty="0"/>
-          </a:p>
-        </p:txBody>
-      </p:sp>
       <p:pic>
         <p:nvPicPr>
-          <p:cNvPr id="21" name="Image 20">
-            <a:extLst>
-              <a:ext uri="{FF2B5EF4-FFF2-40B4-BE49-F238E27FC236}">
-                <a16:creationId xmlns:a16="http://schemas.microsoft.com/office/drawing/2014/main" id="{455B9985-78F6-9001-F3E5-18CB4B3023CA}"/>
+          <p:cNvPr id="9" name="Image 8">
+            <a:extLst>
+              <a:ext uri="{FF2B5EF4-FFF2-40B4-BE49-F238E27FC236}">
+                <a16:creationId xmlns:a16="http://schemas.microsoft.com/office/drawing/2014/main" id="{A81FEC76-2C71-CFA7-E521-902EE8127B11}"/>
               </a:ext>
             </a:extLst>
           </p:cNvPr>
@@ -20957,8 +21149,8 @@
         </p:blipFill>
         <p:spPr>
           <a:xfrm>
-            <a:off x="8638919" y="2247286"/>
-            <a:ext cx="3553081" cy="1400370"/>
+            <a:off x="8277571" y="2383555"/>
+            <a:ext cx="3355818" cy="1143191"/>
           </a:xfrm>
           <a:prstGeom prst="rect">
             <a:avLst/>

</xml_diff>